<commit_message>
added new wireframe image
</commit_message>
<xml_diff>
--- a/images/wireframe.pptx
+++ b/images/wireframe.pptx
@@ -104,6 +104,11 @@
       </a:defRPr>
     </a:lvl9pPr>
   </p:defaultTextStyle>
+  <p:extLst>
+    <p:ext uri="{EFAFB233-063F-42B5-8137-9DF3F51BA10A}">
+      <p15:sldGuideLst xmlns:p15="http://schemas.microsoft.com/office/powerpoint/2012/main"/>
+    </p:ext>
+  </p:extLst>
 </p:presentation>
 </file>
 
@@ -254,7 +259,7 @@
           <a:p>
             <a:fld id="{7C76D50E-DF48-4385-9049-92BEC2BA4038}" type="datetimeFigureOut">
               <a:rPr lang="en-US" smtClean="0"/>
-              <a:t>7/3/2022</a:t>
+              <a:t>7/4/2022</a:t>
             </a:fld>
             <a:endParaRPr lang="en-US"/>
           </a:p>
@@ -452,7 +457,7 @@
           <a:p>
             <a:fld id="{7C76D50E-DF48-4385-9049-92BEC2BA4038}" type="datetimeFigureOut">
               <a:rPr lang="en-US" smtClean="0"/>
-              <a:t>7/3/2022</a:t>
+              <a:t>7/4/2022</a:t>
             </a:fld>
             <a:endParaRPr lang="en-US"/>
           </a:p>
@@ -660,7 +665,7 @@
           <a:p>
             <a:fld id="{7C76D50E-DF48-4385-9049-92BEC2BA4038}" type="datetimeFigureOut">
               <a:rPr lang="en-US" smtClean="0"/>
-              <a:t>7/3/2022</a:t>
+              <a:t>7/4/2022</a:t>
             </a:fld>
             <a:endParaRPr lang="en-US"/>
           </a:p>
@@ -858,7 +863,7 @@
           <a:p>
             <a:fld id="{7C76D50E-DF48-4385-9049-92BEC2BA4038}" type="datetimeFigureOut">
               <a:rPr lang="en-US" smtClean="0"/>
-              <a:t>7/3/2022</a:t>
+              <a:t>7/4/2022</a:t>
             </a:fld>
             <a:endParaRPr lang="en-US"/>
           </a:p>
@@ -1133,7 +1138,7 @@
           <a:p>
             <a:fld id="{7C76D50E-DF48-4385-9049-92BEC2BA4038}" type="datetimeFigureOut">
               <a:rPr lang="en-US" smtClean="0"/>
-              <a:t>7/3/2022</a:t>
+              <a:t>7/4/2022</a:t>
             </a:fld>
             <a:endParaRPr lang="en-US"/>
           </a:p>
@@ -1398,7 +1403,7 @@
           <a:p>
             <a:fld id="{7C76D50E-DF48-4385-9049-92BEC2BA4038}" type="datetimeFigureOut">
               <a:rPr lang="en-US" smtClean="0"/>
-              <a:t>7/3/2022</a:t>
+              <a:t>7/4/2022</a:t>
             </a:fld>
             <a:endParaRPr lang="en-US"/>
           </a:p>
@@ -1810,7 +1815,7 @@
           <a:p>
             <a:fld id="{7C76D50E-DF48-4385-9049-92BEC2BA4038}" type="datetimeFigureOut">
               <a:rPr lang="en-US" smtClean="0"/>
-              <a:t>7/3/2022</a:t>
+              <a:t>7/4/2022</a:t>
             </a:fld>
             <a:endParaRPr lang="en-US"/>
           </a:p>
@@ -1951,7 +1956,7 @@
           <a:p>
             <a:fld id="{7C76D50E-DF48-4385-9049-92BEC2BA4038}" type="datetimeFigureOut">
               <a:rPr lang="en-US" smtClean="0"/>
-              <a:t>7/3/2022</a:t>
+              <a:t>7/4/2022</a:t>
             </a:fld>
             <a:endParaRPr lang="en-US"/>
           </a:p>
@@ -2064,7 +2069,7 @@
           <a:p>
             <a:fld id="{7C76D50E-DF48-4385-9049-92BEC2BA4038}" type="datetimeFigureOut">
               <a:rPr lang="en-US" smtClean="0"/>
-              <a:t>7/3/2022</a:t>
+              <a:t>7/4/2022</a:t>
             </a:fld>
             <a:endParaRPr lang="en-US"/>
           </a:p>
@@ -2375,7 +2380,7 @@
           <a:p>
             <a:fld id="{7C76D50E-DF48-4385-9049-92BEC2BA4038}" type="datetimeFigureOut">
               <a:rPr lang="en-US" smtClean="0"/>
-              <a:t>7/3/2022</a:t>
+              <a:t>7/4/2022</a:t>
             </a:fld>
             <a:endParaRPr lang="en-US"/>
           </a:p>
@@ -2663,7 +2668,7 @@
           <a:p>
             <a:fld id="{7C76D50E-DF48-4385-9049-92BEC2BA4038}" type="datetimeFigureOut">
               <a:rPr lang="en-US" smtClean="0"/>
-              <a:t>7/3/2022</a:t>
+              <a:t>7/4/2022</a:t>
             </a:fld>
             <a:endParaRPr lang="en-US"/>
           </a:p>
@@ -2904,7 +2909,7 @@
           <a:p>
             <a:fld id="{7C76D50E-DF48-4385-9049-92BEC2BA4038}" type="datetimeFigureOut">
               <a:rPr lang="en-US" smtClean="0"/>
-              <a:t>7/3/2022</a:t>
+              <a:t>7/4/2022</a:t>
             </a:fld>
             <a:endParaRPr lang="en-US"/>
           </a:p>
@@ -3321,232 +3326,12 @@
           <a:chExt cx="0" cy="0"/>
         </a:xfrm>
       </p:grpSpPr>
-      <p:sp>
-        <p:nvSpPr>
-          <p:cNvPr id="4" name="Rectangle 3">
-            <a:extLst>
-              <a:ext uri="{FF2B5EF4-FFF2-40B4-BE49-F238E27FC236}">
-                <a16:creationId xmlns:a16="http://schemas.microsoft.com/office/drawing/2014/main" id="{5BF6C615-0AA5-328B-6227-B36831B7AF6B}"/>
-              </a:ext>
-            </a:extLst>
-          </p:cNvPr>
-          <p:cNvSpPr/>
-          <p:nvPr/>
-        </p:nvSpPr>
-        <p:spPr>
-          <a:xfrm>
-            <a:off x="687897" y="746620"/>
-            <a:ext cx="4177718" cy="4823670"/>
-          </a:xfrm>
-          <a:prstGeom prst="rect">
-            <a:avLst/>
-          </a:prstGeom>
-        </p:spPr>
-        <p:style>
-          <a:lnRef idx="2">
-            <a:schemeClr val="dk1"/>
-          </a:lnRef>
-          <a:fillRef idx="1">
-            <a:schemeClr val="lt1"/>
-          </a:fillRef>
-          <a:effectRef idx="0">
-            <a:schemeClr val="dk1"/>
-          </a:effectRef>
-          <a:fontRef idx="minor">
-            <a:schemeClr val="dk1"/>
-          </a:fontRef>
-        </p:style>
-        <p:txBody>
-          <a:bodyPr rtlCol="0" anchor="ctr"/>
-          <a:lstStyle/>
-          <a:p>
-            <a:pPr algn="ctr"/>
-            <a:endParaRPr lang="en-US"/>
-          </a:p>
-        </p:txBody>
-      </p:sp>
-      <p:sp>
-        <p:nvSpPr>
-          <p:cNvPr id="5" name="Rectangle 4">
-            <a:extLst>
-              <a:ext uri="{FF2B5EF4-FFF2-40B4-BE49-F238E27FC236}">
-                <a16:creationId xmlns:a16="http://schemas.microsoft.com/office/drawing/2014/main" id="{88BC06A5-072C-45E1-6B79-3DA9DA0EACB8}"/>
-              </a:ext>
-            </a:extLst>
-          </p:cNvPr>
-          <p:cNvSpPr/>
-          <p:nvPr/>
-        </p:nvSpPr>
-        <p:spPr>
-          <a:xfrm>
-            <a:off x="5985544" y="650845"/>
-            <a:ext cx="1974210" cy="2095851"/>
-          </a:xfrm>
-          <a:prstGeom prst="rect">
-            <a:avLst/>
-          </a:prstGeom>
-        </p:spPr>
-        <p:style>
-          <a:lnRef idx="2">
-            <a:schemeClr val="dk1"/>
-          </a:lnRef>
-          <a:fillRef idx="1">
-            <a:schemeClr val="lt1"/>
-          </a:fillRef>
-          <a:effectRef idx="0">
-            <a:schemeClr val="dk1"/>
-          </a:effectRef>
-          <a:fontRef idx="minor">
-            <a:schemeClr val="dk1"/>
-          </a:fontRef>
-        </p:style>
-        <p:txBody>
-          <a:bodyPr rtlCol="0" anchor="ctr"/>
-          <a:lstStyle/>
-          <a:p>
-            <a:pPr algn="ctr"/>
-            <a:endParaRPr lang="en-US" dirty="0"/>
-          </a:p>
-        </p:txBody>
-      </p:sp>
-      <p:sp>
-        <p:nvSpPr>
-          <p:cNvPr id="6" name="Rectangle 5">
-            <a:extLst>
-              <a:ext uri="{FF2B5EF4-FFF2-40B4-BE49-F238E27FC236}">
-                <a16:creationId xmlns:a16="http://schemas.microsoft.com/office/drawing/2014/main" id="{1444250D-F122-4887-D373-CE23911F2C50}"/>
-              </a:ext>
-            </a:extLst>
-          </p:cNvPr>
-          <p:cNvSpPr/>
-          <p:nvPr/>
-        </p:nvSpPr>
-        <p:spPr>
-          <a:xfrm>
-            <a:off x="5985544" y="3263317"/>
-            <a:ext cx="1974210" cy="2206305"/>
-          </a:xfrm>
-          <a:prstGeom prst="rect">
-            <a:avLst/>
-          </a:prstGeom>
-        </p:spPr>
-        <p:style>
-          <a:lnRef idx="2">
-            <a:schemeClr val="dk1"/>
-          </a:lnRef>
-          <a:fillRef idx="1">
-            <a:schemeClr val="lt1"/>
-          </a:fillRef>
-          <a:effectRef idx="0">
-            <a:schemeClr val="dk1"/>
-          </a:effectRef>
-          <a:fontRef idx="minor">
-            <a:schemeClr val="dk1"/>
-          </a:fontRef>
-        </p:style>
-        <p:txBody>
-          <a:bodyPr rtlCol="0" anchor="ctr"/>
-          <a:lstStyle/>
-          <a:p>
-            <a:pPr algn="ctr"/>
-            <a:endParaRPr lang="en-US" dirty="0"/>
-          </a:p>
-        </p:txBody>
-      </p:sp>
-      <p:sp>
-        <p:nvSpPr>
-          <p:cNvPr id="7" name="Rectangle 6">
-            <a:extLst>
-              <a:ext uri="{FF2B5EF4-FFF2-40B4-BE49-F238E27FC236}">
-                <a16:creationId xmlns:a16="http://schemas.microsoft.com/office/drawing/2014/main" id="{9B92FFA4-F0E3-B74F-45A0-8B629292AAE7}"/>
-              </a:ext>
-            </a:extLst>
-          </p:cNvPr>
-          <p:cNvSpPr/>
-          <p:nvPr/>
-        </p:nvSpPr>
-        <p:spPr>
-          <a:xfrm>
-            <a:off x="8453306" y="3263317"/>
-            <a:ext cx="1772874" cy="2206305"/>
-          </a:xfrm>
-          <a:prstGeom prst="rect">
-            <a:avLst/>
-          </a:prstGeom>
-        </p:spPr>
-        <p:style>
-          <a:lnRef idx="2">
-            <a:schemeClr val="dk1"/>
-          </a:lnRef>
-          <a:fillRef idx="1">
-            <a:schemeClr val="lt1"/>
-          </a:fillRef>
-          <a:effectRef idx="0">
-            <a:schemeClr val="dk1"/>
-          </a:effectRef>
-          <a:fontRef idx="minor">
-            <a:schemeClr val="dk1"/>
-          </a:fontRef>
-        </p:style>
-        <p:txBody>
-          <a:bodyPr rtlCol="0" anchor="ctr"/>
-          <a:lstStyle/>
-          <a:p>
-            <a:pPr algn="ctr"/>
-            <a:endParaRPr lang="en-US" dirty="0"/>
-          </a:p>
-        </p:txBody>
-      </p:sp>
-      <p:sp>
-        <p:nvSpPr>
-          <p:cNvPr id="8" name="Rectangle 7">
-            <a:extLst>
-              <a:ext uri="{FF2B5EF4-FFF2-40B4-BE49-F238E27FC236}">
-                <a16:creationId xmlns:a16="http://schemas.microsoft.com/office/drawing/2014/main" id="{1E049ECF-8683-4743-79B9-E113A62A7E60}"/>
-              </a:ext>
-            </a:extLst>
-          </p:cNvPr>
-          <p:cNvSpPr/>
-          <p:nvPr/>
-        </p:nvSpPr>
-        <p:spPr>
-          <a:xfrm>
-            <a:off x="8453306" y="650845"/>
-            <a:ext cx="1772874" cy="2000076"/>
-          </a:xfrm>
-          <a:prstGeom prst="rect">
-            <a:avLst/>
-          </a:prstGeom>
-        </p:spPr>
-        <p:style>
-          <a:lnRef idx="2">
-            <a:schemeClr val="dk1"/>
-          </a:lnRef>
-          <a:fillRef idx="1">
-            <a:schemeClr val="lt1"/>
-          </a:fillRef>
-          <a:effectRef idx="0">
-            <a:schemeClr val="dk1"/>
-          </a:effectRef>
-          <a:fontRef idx="minor">
-            <a:schemeClr val="dk1"/>
-          </a:fontRef>
-        </p:style>
-        <p:txBody>
-          <a:bodyPr rtlCol="0" anchor="ctr"/>
-          <a:lstStyle/>
-          <a:p>
-            <a:pPr algn="ctr"/>
-            <a:endParaRPr lang="en-US" dirty="0"/>
-          </a:p>
-        </p:txBody>
-      </p:sp>
       <p:pic>
         <p:nvPicPr>
-          <p:cNvPr id="12" name="Picture 11">
-            <a:extLst>
-              <a:ext uri="{FF2B5EF4-FFF2-40B4-BE49-F238E27FC236}">
-                <a16:creationId xmlns:a16="http://schemas.microsoft.com/office/drawing/2014/main" id="{749B0179-BAFF-9E63-C6FE-B482D441E719}"/>
+          <p:cNvPr id="21" name="Picture 20">
+            <a:extLst>
+              <a:ext uri="{FF2B5EF4-FFF2-40B4-BE49-F238E27FC236}">
+                <a16:creationId xmlns:a16="http://schemas.microsoft.com/office/drawing/2014/main" id="{F88D7E04-9D71-6154-C5A0-2FF23C6C4492}"/>
               </a:ext>
             </a:extLst>
           </p:cNvPr>
@@ -3569,8 +3354,8 @@
         </p:blipFill>
         <p:spPr>
           <a:xfrm>
-            <a:off x="687897" y="759203"/>
-            <a:ext cx="4177718" cy="4710419"/>
+            <a:off x="184558" y="2059514"/>
+            <a:ext cx="2438654" cy="1708518"/>
           </a:xfrm>
           <a:prstGeom prst="rect">
             <a:avLst/>
@@ -3579,10 +3364,10 @@
       </p:pic>
       <p:sp>
         <p:nvSpPr>
-          <p:cNvPr id="13" name="Rectangle 12">
-            <a:extLst>
-              <a:ext uri="{FF2B5EF4-FFF2-40B4-BE49-F238E27FC236}">
-                <a16:creationId xmlns:a16="http://schemas.microsoft.com/office/drawing/2014/main" id="{FE056964-717D-5D69-41F9-101E0CB6FBED}"/>
+          <p:cNvPr id="4" name="Rectangle 3">
+            <a:extLst>
+              <a:ext uri="{FF2B5EF4-FFF2-40B4-BE49-F238E27FC236}">
+                <a16:creationId xmlns:a16="http://schemas.microsoft.com/office/drawing/2014/main" id="{5BF6C615-0AA5-328B-6227-B36831B7AF6B}"/>
               </a:ext>
             </a:extLst>
           </p:cNvPr>
@@ -3591,8 +3376,8 @@
         </p:nvSpPr>
         <p:spPr>
           <a:xfrm>
-            <a:off x="687897" y="864066"/>
-            <a:ext cx="914400" cy="545284"/>
+            <a:off x="3112666" y="484830"/>
+            <a:ext cx="4177718" cy="4823670"/>
           </a:xfrm>
           <a:prstGeom prst="rect">
             <a:avLst/>
@@ -3617,19 +3402,16 @@
           <a:lstStyle/>
           <a:p>
             <a:pPr algn="ctr"/>
-            <a:r>
-              <a:rPr lang="en-US" dirty="0"/>
-              <a:t>Logo</a:t>
-            </a:r>
-          </a:p>
-        </p:txBody>
-      </p:sp>
-      <p:sp>
-        <p:nvSpPr>
-          <p:cNvPr id="15" name="Rectangle 14">
-            <a:extLst>
-              <a:ext uri="{FF2B5EF4-FFF2-40B4-BE49-F238E27FC236}">
-                <a16:creationId xmlns:a16="http://schemas.microsoft.com/office/drawing/2014/main" id="{19B622ED-67C4-9651-5519-58EFA7EF7655}"/>
+            <a:endParaRPr lang="en-US"/>
+          </a:p>
+        </p:txBody>
+      </p:sp>
+      <p:sp>
+        <p:nvSpPr>
+          <p:cNvPr id="5" name="Rectangle 4">
+            <a:extLst>
+              <a:ext uri="{FF2B5EF4-FFF2-40B4-BE49-F238E27FC236}">
+                <a16:creationId xmlns:a16="http://schemas.microsoft.com/office/drawing/2014/main" id="{88BC06A5-072C-45E1-6B79-3DA9DA0EACB8}"/>
               </a:ext>
             </a:extLst>
           </p:cNvPr>
@@ -3638,8 +3420,8 @@
         </p:nvSpPr>
         <p:spPr>
           <a:xfrm>
-            <a:off x="1634455" y="1015068"/>
-            <a:ext cx="764796" cy="394282"/>
+            <a:off x="7629787" y="508233"/>
+            <a:ext cx="1974210" cy="2095851"/>
           </a:xfrm>
           <a:prstGeom prst="rect">
             <a:avLst/>
@@ -3664,19 +3446,16 @@
           <a:lstStyle/>
           <a:p>
             <a:pPr algn="ctr"/>
-            <a:r>
-              <a:rPr lang="en-US" sz="1100" dirty="0"/>
-              <a:t>schedule</a:t>
-            </a:r>
-          </a:p>
-        </p:txBody>
-      </p:sp>
-      <p:sp>
-        <p:nvSpPr>
-          <p:cNvPr id="16" name="Rectangle 15">
-            <a:extLst>
-              <a:ext uri="{FF2B5EF4-FFF2-40B4-BE49-F238E27FC236}">
-                <a16:creationId xmlns:a16="http://schemas.microsoft.com/office/drawing/2014/main" id="{57292EA4-536F-2E59-9834-FF87ED32FD99}"/>
+            <a:endParaRPr lang="en-US" dirty="0"/>
+          </a:p>
+        </p:txBody>
+      </p:sp>
+      <p:sp>
+        <p:nvSpPr>
+          <p:cNvPr id="6" name="Rectangle 5">
+            <a:extLst>
+              <a:ext uri="{FF2B5EF4-FFF2-40B4-BE49-F238E27FC236}">
+                <a16:creationId xmlns:a16="http://schemas.microsoft.com/office/drawing/2014/main" id="{1444250D-F122-4887-D373-CE23911F2C50}"/>
               </a:ext>
             </a:extLst>
           </p:cNvPr>
@@ -3685,8 +3464,8 @@
         </p:nvSpPr>
         <p:spPr>
           <a:xfrm>
-            <a:off x="2431408" y="1015068"/>
-            <a:ext cx="728443" cy="394282"/>
+            <a:off x="7629787" y="3120705"/>
+            <a:ext cx="1974210" cy="2206305"/>
           </a:xfrm>
           <a:prstGeom prst="rect">
             <a:avLst/>
@@ -3711,19 +3490,16 @@
           <a:lstStyle/>
           <a:p>
             <a:pPr algn="ctr"/>
-            <a:r>
-              <a:rPr lang="en-US" sz="1100" dirty="0"/>
-              <a:t>Types of Yoga</a:t>
-            </a:r>
-          </a:p>
-        </p:txBody>
-      </p:sp>
-      <p:sp>
-        <p:nvSpPr>
-          <p:cNvPr id="17" name="Rectangle 16">
-            <a:extLst>
-              <a:ext uri="{FF2B5EF4-FFF2-40B4-BE49-F238E27FC236}">
-                <a16:creationId xmlns:a16="http://schemas.microsoft.com/office/drawing/2014/main" id="{38C2AEF9-54B8-66A7-284A-0D1EA8C76682}"/>
+            <a:endParaRPr lang="en-US" dirty="0"/>
+          </a:p>
+        </p:txBody>
+      </p:sp>
+      <p:sp>
+        <p:nvSpPr>
+          <p:cNvPr id="7" name="Rectangle 6">
+            <a:extLst>
+              <a:ext uri="{FF2B5EF4-FFF2-40B4-BE49-F238E27FC236}">
+                <a16:creationId xmlns:a16="http://schemas.microsoft.com/office/drawing/2014/main" id="{9B92FFA4-F0E3-B74F-45A0-8B629292AAE7}"/>
               </a:ext>
             </a:extLst>
           </p:cNvPr>
@@ -3732,8 +3508,8 @@
         </p:nvSpPr>
         <p:spPr>
           <a:xfrm>
-            <a:off x="3252132" y="1006678"/>
-            <a:ext cx="760600" cy="402672"/>
+            <a:off x="10097549" y="3120705"/>
+            <a:ext cx="1772874" cy="2206305"/>
           </a:xfrm>
           <a:prstGeom prst="rect">
             <a:avLst/>
@@ -3758,19 +3534,16 @@
           <a:lstStyle/>
           <a:p>
             <a:pPr algn="ctr"/>
-            <a:r>
-              <a:rPr lang="en-US" sz="1100" dirty="0"/>
-              <a:t>Online classes</a:t>
-            </a:r>
-          </a:p>
-        </p:txBody>
-      </p:sp>
-      <p:sp>
-        <p:nvSpPr>
-          <p:cNvPr id="18" name="Rectangle 17">
-            <a:extLst>
-              <a:ext uri="{FF2B5EF4-FFF2-40B4-BE49-F238E27FC236}">
-                <a16:creationId xmlns:a16="http://schemas.microsoft.com/office/drawing/2014/main" id="{17EB8322-0B66-1E7A-7968-98CFCD062F3F}"/>
+            <a:endParaRPr lang="en-US" dirty="0"/>
+          </a:p>
+        </p:txBody>
+      </p:sp>
+      <p:sp>
+        <p:nvSpPr>
+          <p:cNvPr id="8" name="Rectangle 7">
+            <a:extLst>
+              <a:ext uri="{FF2B5EF4-FFF2-40B4-BE49-F238E27FC236}">
+                <a16:creationId xmlns:a16="http://schemas.microsoft.com/office/drawing/2014/main" id="{1E049ECF-8683-4743-79B9-E113A62A7E60}"/>
               </a:ext>
             </a:extLst>
           </p:cNvPr>
@@ -3779,8 +3552,8 @@
         </p:nvSpPr>
         <p:spPr>
           <a:xfrm>
-            <a:off x="4117594" y="1023456"/>
-            <a:ext cx="545284" cy="364922"/>
+            <a:off x="10097549" y="508233"/>
+            <a:ext cx="1772874" cy="2000076"/>
           </a:xfrm>
           <a:prstGeom prst="rect">
             <a:avLst/>
@@ -3805,6 +3578,274 @@
           <a:lstStyle/>
           <a:p>
             <a:pPr algn="ctr"/>
+            <a:endParaRPr lang="en-US" dirty="0"/>
+          </a:p>
+        </p:txBody>
+      </p:sp>
+      <p:pic>
+        <p:nvPicPr>
+          <p:cNvPr id="12" name="Picture 11">
+            <a:extLst>
+              <a:ext uri="{FF2B5EF4-FFF2-40B4-BE49-F238E27FC236}">
+                <a16:creationId xmlns:a16="http://schemas.microsoft.com/office/drawing/2014/main" id="{749B0179-BAFF-9E63-C6FE-B482D441E719}"/>
+              </a:ext>
+            </a:extLst>
+          </p:cNvPr>
+          <p:cNvPicPr>
+            <a:picLocks noChangeAspect="1"/>
+          </p:cNvPicPr>
+          <p:nvPr/>
+        </p:nvPicPr>
+        <p:blipFill>
+          <a:blip r:embed="rId3">
+            <a:extLst>
+              <a:ext uri="{28A0092B-C50C-407E-A947-70E740481C1C}">
+                <a14:useLocalDpi xmlns:a14="http://schemas.microsoft.com/office/drawing/2010/main" val="0"/>
+              </a:ext>
+            </a:extLst>
+          </a:blip>
+          <a:stretch>
+            <a:fillRect/>
+          </a:stretch>
+        </p:blipFill>
+        <p:spPr>
+          <a:xfrm>
+            <a:off x="3112666" y="497413"/>
+            <a:ext cx="4177718" cy="4710419"/>
+          </a:xfrm>
+          <a:prstGeom prst="rect">
+            <a:avLst/>
+          </a:prstGeom>
+        </p:spPr>
+      </p:pic>
+      <p:sp>
+        <p:nvSpPr>
+          <p:cNvPr id="13" name="Rectangle 12">
+            <a:extLst>
+              <a:ext uri="{FF2B5EF4-FFF2-40B4-BE49-F238E27FC236}">
+                <a16:creationId xmlns:a16="http://schemas.microsoft.com/office/drawing/2014/main" id="{FE056964-717D-5D69-41F9-101E0CB6FBED}"/>
+              </a:ext>
+            </a:extLst>
+          </p:cNvPr>
+          <p:cNvSpPr/>
+          <p:nvPr/>
+        </p:nvSpPr>
+        <p:spPr>
+          <a:xfrm>
+            <a:off x="3112666" y="602276"/>
+            <a:ext cx="914400" cy="545284"/>
+          </a:xfrm>
+          <a:prstGeom prst="rect">
+            <a:avLst/>
+          </a:prstGeom>
+        </p:spPr>
+        <p:style>
+          <a:lnRef idx="2">
+            <a:schemeClr val="dk1"/>
+          </a:lnRef>
+          <a:fillRef idx="1">
+            <a:schemeClr val="lt1"/>
+          </a:fillRef>
+          <a:effectRef idx="0">
+            <a:schemeClr val="dk1"/>
+          </a:effectRef>
+          <a:fontRef idx="minor">
+            <a:schemeClr val="dk1"/>
+          </a:fontRef>
+        </p:style>
+        <p:txBody>
+          <a:bodyPr rtlCol="0" anchor="ctr"/>
+          <a:lstStyle/>
+          <a:p>
+            <a:pPr algn="ctr"/>
+            <a:r>
+              <a:rPr lang="en-US" dirty="0"/>
+              <a:t>Logo</a:t>
+            </a:r>
+          </a:p>
+        </p:txBody>
+      </p:sp>
+      <p:sp>
+        <p:nvSpPr>
+          <p:cNvPr id="15" name="Rectangle 14">
+            <a:extLst>
+              <a:ext uri="{FF2B5EF4-FFF2-40B4-BE49-F238E27FC236}">
+                <a16:creationId xmlns:a16="http://schemas.microsoft.com/office/drawing/2014/main" id="{19B622ED-67C4-9651-5519-58EFA7EF7655}"/>
+              </a:ext>
+            </a:extLst>
+          </p:cNvPr>
+          <p:cNvSpPr/>
+          <p:nvPr/>
+        </p:nvSpPr>
+        <p:spPr>
+          <a:xfrm>
+            <a:off x="4020774" y="711185"/>
+            <a:ext cx="764796" cy="394282"/>
+          </a:xfrm>
+          <a:prstGeom prst="rect">
+            <a:avLst/>
+          </a:prstGeom>
+        </p:spPr>
+        <p:style>
+          <a:lnRef idx="2">
+            <a:schemeClr val="dk1"/>
+          </a:lnRef>
+          <a:fillRef idx="1">
+            <a:schemeClr val="lt1"/>
+          </a:fillRef>
+          <a:effectRef idx="0">
+            <a:schemeClr val="dk1"/>
+          </a:effectRef>
+          <a:fontRef idx="minor">
+            <a:schemeClr val="dk1"/>
+          </a:fontRef>
+        </p:style>
+        <p:txBody>
+          <a:bodyPr rtlCol="0" anchor="ctr"/>
+          <a:lstStyle/>
+          <a:p>
+            <a:pPr algn="ctr"/>
+            <a:r>
+              <a:rPr lang="en-US" sz="1100" dirty="0"/>
+              <a:t>schedule</a:t>
+            </a:r>
+          </a:p>
+        </p:txBody>
+      </p:sp>
+      <p:sp>
+        <p:nvSpPr>
+          <p:cNvPr id="16" name="Rectangle 15">
+            <a:extLst>
+              <a:ext uri="{FF2B5EF4-FFF2-40B4-BE49-F238E27FC236}">
+                <a16:creationId xmlns:a16="http://schemas.microsoft.com/office/drawing/2014/main" id="{57292EA4-536F-2E59-9834-FF87ED32FD99}"/>
+              </a:ext>
+            </a:extLst>
+          </p:cNvPr>
+          <p:cNvSpPr/>
+          <p:nvPr/>
+        </p:nvSpPr>
+        <p:spPr>
+          <a:xfrm>
+            <a:off x="4772638" y="711185"/>
+            <a:ext cx="728443" cy="394282"/>
+          </a:xfrm>
+          <a:prstGeom prst="rect">
+            <a:avLst/>
+          </a:prstGeom>
+        </p:spPr>
+        <p:style>
+          <a:lnRef idx="2">
+            <a:schemeClr val="dk1"/>
+          </a:lnRef>
+          <a:fillRef idx="1">
+            <a:schemeClr val="lt1"/>
+          </a:fillRef>
+          <a:effectRef idx="0">
+            <a:schemeClr val="dk1"/>
+          </a:effectRef>
+          <a:fontRef idx="minor">
+            <a:schemeClr val="dk1"/>
+          </a:fontRef>
+        </p:style>
+        <p:txBody>
+          <a:bodyPr rtlCol="0" anchor="ctr"/>
+          <a:lstStyle/>
+          <a:p>
+            <a:pPr algn="ctr"/>
+            <a:r>
+              <a:rPr lang="en-US" sz="1100" dirty="0"/>
+              <a:t>Types of Yoga</a:t>
+            </a:r>
+          </a:p>
+        </p:txBody>
+      </p:sp>
+      <p:sp>
+        <p:nvSpPr>
+          <p:cNvPr id="17" name="Rectangle 16">
+            <a:extLst>
+              <a:ext uri="{FF2B5EF4-FFF2-40B4-BE49-F238E27FC236}">
+                <a16:creationId xmlns:a16="http://schemas.microsoft.com/office/drawing/2014/main" id="{38C2AEF9-54B8-66A7-284A-0D1EA8C76682}"/>
+              </a:ext>
+            </a:extLst>
+          </p:cNvPr>
+          <p:cNvSpPr/>
+          <p:nvPr/>
+        </p:nvSpPr>
+        <p:spPr>
+          <a:xfrm>
+            <a:off x="5485695" y="697700"/>
+            <a:ext cx="760600" cy="402672"/>
+          </a:xfrm>
+          <a:prstGeom prst="rect">
+            <a:avLst/>
+          </a:prstGeom>
+        </p:spPr>
+        <p:style>
+          <a:lnRef idx="2">
+            <a:schemeClr val="dk1"/>
+          </a:lnRef>
+          <a:fillRef idx="1">
+            <a:schemeClr val="lt1"/>
+          </a:fillRef>
+          <a:effectRef idx="0">
+            <a:schemeClr val="dk1"/>
+          </a:effectRef>
+          <a:fontRef idx="minor">
+            <a:schemeClr val="dk1"/>
+          </a:fontRef>
+        </p:style>
+        <p:txBody>
+          <a:bodyPr rtlCol="0" anchor="ctr"/>
+          <a:lstStyle/>
+          <a:p>
+            <a:pPr algn="ctr"/>
+            <a:r>
+              <a:rPr lang="en-US" sz="1100" dirty="0"/>
+              <a:t>Online classes</a:t>
+            </a:r>
+          </a:p>
+        </p:txBody>
+      </p:sp>
+      <p:sp>
+        <p:nvSpPr>
+          <p:cNvPr id="18" name="Rectangle 17">
+            <a:extLst>
+              <a:ext uri="{FF2B5EF4-FFF2-40B4-BE49-F238E27FC236}">
+                <a16:creationId xmlns:a16="http://schemas.microsoft.com/office/drawing/2014/main" id="{17EB8322-0B66-1E7A-7968-98CFCD062F3F}"/>
+              </a:ext>
+            </a:extLst>
+          </p:cNvPr>
+          <p:cNvSpPr/>
+          <p:nvPr/>
+        </p:nvSpPr>
+        <p:spPr>
+          <a:xfrm>
+            <a:off x="6244014" y="711184"/>
+            <a:ext cx="545284" cy="389187"/>
+          </a:xfrm>
+          <a:prstGeom prst="rect">
+            <a:avLst/>
+          </a:prstGeom>
+        </p:spPr>
+        <p:style>
+          <a:lnRef idx="2">
+            <a:schemeClr val="dk1"/>
+          </a:lnRef>
+          <a:fillRef idx="1">
+            <a:schemeClr val="lt1"/>
+          </a:fillRef>
+          <a:effectRef idx="0">
+            <a:schemeClr val="dk1"/>
+          </a:effectRef>
+          <a:fontRef idx="minor">
+            <a:schemeClr val="dk1"/>
+          </a:fontRef>
+        </p:style>
+        <p:txBody>
+          <a:bodyPr rtlCol="0" anchor="ctr"/>
+          <a:lstStyle/>
+          <a:p>
+            <a:pPr algn="ctr"/>
             <a:r>
               <a:rPr lang="en-US" sz="1100" dirty="0"/>
               <a:t>About</a:t>
@@ -3826,7 +3867,7 @@
         </p:nvSpPr>
         <p:spPr>
           <a:xfrm>
-            <a:off x="1015068" y="1879134"/>
+            <a:off x="3439837" y="1617344"/>
             <a:ext cx="3607266" cy="1549866"/>
           </a:xfrm>
           <a:prstGeom prst="rect">
@@ -3873,7 +3914,7 @@
         </p:nvSpPr>
         <p:spPr>
           <a:xfrm>
-            <a:off x="687897" y="4462943"/>
+            <a:off x="3112666" y="4201153"/>
             <a:ext cx="4177718" cy="1119930"/>
           </a:xfrm>
           <a:prstGeom prst="rect">
@@ -3920,7 +3961,7 @@
         </p:nvSpPr>
         <p:spPr>
           <a:xfrm>
-            <a:off x="6645656" y="661791"/>
+            <a:off x="8289899" y="519179"/>
             <a:ext cx="1291905" cy="385894"/>
           </a:xfrm>
           <a:prstGeom prst="rect">
@@ -3969,7 +4010,7 @@
         </p:nvSpPr>
         <p:spPr>
           <a:xfrm>
-            <a:off x="8934275" y="641059"/>
+            <a:off x="10578518" y="498447"/>
             <a:ext cx="1291905" cy="385894"/>
           </a:xfrm>
           <a:prstGeom prst="rect">
@@ -4018,7 +4059,7 @@
         </p:nvSpPr>
         <p:spPr>
           <a:xfrm>
-            <a:off x="6687423" y="3263315"/>
+            <a:off x="8331666" y="3120703"/>
             <a:ext cx="1291905" cy="461395"/>
           </a:xfrm>
           <a:prstGeom prst="rect">
@@ -4067,7 +4108,7 @@
         </p:nvSpPr>
         <p:spPr>
           <a:xfrm>
-            <a:off x="9079683" y="3248809"/>
+            <a:off x="10723926" y="3106197"/>
             <a:ext cx="1146497" cy="385894"/>
           </a:xfrm>
           <a:prstGeom prst="rect">
@@ -4117,7 +4158,7 @@
           <p:nvPr/>
         </p:nvPicPr>
         <p:blipFill>
-          <a:blip r:embed="rId3">
+          <a:blip r:embed="rId4">
             <a:extLst>
               <a:ext uri="{28A0092B-C50C-407E-A947-70E740481C1C}">
                 <a14:useLocalDpi xmlns:a14="http://schemas.microsoft.com/office/drawing/2010/main" val="0"/>
@@ -4130,7 +4171,7 @@
         </p:blipFill>
         <p:spPr>
           <a:xfrm>
-            <a:off x="5985544" y="1214703"/>
+            <a:off x="7629787" y="1072091"/>
             <a:ext cx="1964451" cy="1172028"/>
           </a:xfrm>
           <a:prstGeom prst="rect">
@@ -4152,7 +4193,7 @@
         </p:nvSpPr>
         <p:spPr>
           <a:xfrm>
-            <a:off x="8556771" y="1096860"/>
+            <a:off x="10201014" y="954248"/>
             <a:ext cx="513153" cy="312490"/>
           </a:xfrm>
           <a:prstGeom prst="rect">
@@ -4198,7 +4239,7 @@
         </p:nvSpPr>
         <p:spPr>
           <a:xfrm>
-            <a:off x="8566530" y="1524349"/>
+            <a:off x="10210773" y="1381737"/>
             <a:ext cx="513153" cy="312490"/>
           </a:xfrm>
           <a:prstGeom prst="rect">
@@ -4244,7 +4285,7 @@
         </p:nvSpPr>
         <p:spPr>
           <a:xfrm>
-            <a:off x="8566530" y="1912688"/>
+            <a:off x="10210773" y="1770076"/>
             <a:ext cx="513153" cy="312490"/>
           </a:xfrm>
           <a:prstGeom prst="rect">
@@ -4290,7 +4331,7 @@
         </p:nvSpPr>
         <p:spPr>
           <a:xfrm>
-            <a:off x="8566530" y="2309416"/>
+            <a:off x="10210773" y="2166804"/>
             <a:ext cx="513153" cy="312490"/>
           </a:xfrm>
           <a:prstGeom prst="rect">
@@ -4337,7 +4378,7 @@
           <p:nvPr/>
         </p:nvPicPr>
         <p:blipFill>
-          <a:blip r:embed="rId4">
+          <a:blip r:embed="rId5">
             <a:extLst>
               <a:ext uri="{28A0092B-C50C-407E-A947-70E740481C1C}">
                 <a14:useLocalDpi xmlns:a14="http://schemas.microsoft.com/office/drawing/2010/main" val="0"/>
@@ -4350,7 +4391,7 @@
         </p:blipFill>
         <p:spPr>
           <a:xfrm>
-            <a:off x="8636465" y="1094109"/>
+            <a:off x="10280708" y="951497"/>
             <a:ext cx="419449" cy="304101"/>
           </a:xfrm>
           <a:prstGeom prst="rect">
@@ -4373,7 +4414,7 @@
           <p:nvPr/>
         </p:nvPicPr>
         <p:blipFill>
-          <a:blip r:embed="rId4">
+          <a:blip r:embed="rId5">
             <a:extLst>
               <a:ext uri="{28A0092B-C50C-407E-A947-70E740481C1C}">
                 <a14:useLocalDpi xmlns:a14="http://schemas.microsoft.com/office/drawing/2010/main" val="0"/>
@@ -4386,7 +4427,7 @@
         </p:blipFill>
         <p:spPr>
           <a:xfrm>
-            <a:off x="8603622" y="1505474"/>
+            <a:off x="10247865" y="1362862"/>
             <a:ext cx="419449" cy="304101"/>
           </a:xfrm>
           <a:prstGeom prst="rect">
@@ -4409,7 +4450,7 @@
           <p:nvPr/>
         </p:nvPicPr>
         <p:blipFill>
-          <a:blip r:embed="rId4">
+          <a:blip r:embed="rId5">
             <a:extLst>
               <a:ext uri="{28A0092B-C50C-407E-A947-70E740481C1C}">
                 <a14:useLocalDpi xmlns:a14="http://schemas.microsoft.com/office/drawing/2010/main" val="0"/>
@@ -4422,7 +4463,7 @@
         </p:blipFill>
         <p:spPr>
           <a:xfrm>
-            <a:off x="8591750" y="1916883"/>
+            <a:off x="10235993" y="1774271"/>
             <a:ext cx="419449" cy="304101"/>
           </a:xfrm>
           <a:prstGeom prst="rect">
@@ -4445,7 +4486,7 @@
           <p:nvPr/>
         </p:nvPicPr>
         <p:blipFill>
-          <a:blip r:embed="rId4">
+          <a:blip r:embed="rId5">
             <a:extLst>
               <a:ext uri="{28A0092B-C50C-407E-A947-70E740481C1C}">
                 <a14:useLocalDpi xmlns:a14="http://schemas.microsoft.com/office/drawing/2010/main" val="0"/>
@@ -4458,7 +4499,7 @@
         </p:blipFill>
         <p:spPr>
           <a:xfrm>
-            <a:off x="8613381" y="2332312"/>
+            <a:off x="10257624" y="2189700"/>
             <a:ext cx="419449" cy="304101"/>
           </a:xfrm>
           <a:prstGeom prst="rect">
@@ -4480,7 +4521,7 @@
         </p:nvSpPr>
         <p:spPr>
           <a:xfrm>
-            <a:off x="9197128" y="1057013"/>
+            <a:off x="10841371" y="914401"/>
             <a:ext cx="840297" cy="331365"/>
           </a:xfrm>
           <a:prstGeom prst="rect">
@@ -4527,7 +4568,7 @@
         </p:nvSpPr>
         <p:spPr>
           <a:xfrm>
-            <a:off x="9207273" y="1528544"/>
+            <a:off x="10851516" y="1385932"/>
             <a:ext cx="840297" cy="331365"/>
           </a:xfrm>
           <a:prstGeom prst="rect">
@@ -4574,7 +4615,7 @@
         </p:nvSpPr>
         <p:spPr>
           <a:xfrm>
-            <a:off x="9197128" y="1950437"/>
+            <a:off x="10841371" y="1807825"/>
             <a:ext cx="840297" cy="331365"/>
           </a:xfrm>
           <a:prstGeom prst="rect">
@@ -4621,7 +4662,7 @@
         </p:nvSpPr>
         <p:spPr>
           <a:xfrm>
-            <a:off x="9207273" y="2344716"/>
+            <a:off x="10851516" y="2202104"/>
             <a:ext cx="840297" cy="331365"/>
           </a:xfrm>
           <a:prstGeom prst="rect">
@@ -4668,7 +4709,7 @@
         </p:nvSpPr>
         <p:spPr>
           <a:xfrm>
-            <a:off x="5952166" y="655938"/>
+            <a:off x="7596409" y="513326"/>
             <a:ext cx="693490" cy="350740"/>
           </a:xfrm>
           <a:prstGeom prst="rect">
@@ -4715,7 +4756,7 @@
         </p:nvSpPr>
         <p:spPr>
           <a:xfrm>
-            <a:off x="8376762" y="640025"/>
+            <a:off x="10021005" y="497413"/>
             <a:ext cx="693490" cy="350740"/>
           </a:xfrm>
           <a:prstGeom prst="rect">
@@ -4762,7 +4803,7 @@
         </p:nvSpPr>
         <p:spPr>
           <a:xfrm>
-            <a:off x="5965970" y="3263315"/>
+            <a:off x="7610213" y="3120703"/>
             <a:ext cx="693490" cy="350740"/>
           </a:xfrm>
           <a:prstGeom prst="rect">
@@ -4809,7 +4850,7 @@
         </p:nvSpPr>
         <p:spPr>
           <a:xfrm>
-            <a:off x="8465890" y="3283963"/>
+            <a:off x="10110133" y="3141351"/>
             <a:ext cx="566940" cy="350740"/>
           </a:xfrm>
           <a:prstGeom prst="rect">
@@ -4856,7 +4897,7 @@
         </p:nvSpPr>
         <p:spPr>
           <a:xfrm>
-            <a:off x="6096000" y="4307831"/>
+            <a:off x="7740243" y="4165219"/>
             <a:ext cx="591423" cy="365615"/>
           </a:xfrm>
           <a:prstGeom prst="rect">
@@ -4902,7 +4943,7 @@
         </p:nvSpPr>
         <p:spPr>
           <a:xfrm>
-            <a:off x="6096000" y="4739948"/>
+            <a:off x="7740243" y="4597336"/>
             <a:ext cx="591423" cy="365615"/>
           </a:xfrm>
           <a:prstGeom prst="rect">
@@ -4948,7 +4989,7 @@
         </p:nvSpPr>
         <p:spPr>
           <a:xfrm>
-            <a:off x="6885263" y="3875714"/>
+            <a:off x="8529506" y="3733102"/>
             <a:ext cx="591423" cy="365615"/>
           </a:xfrm>
           <a:prstGeom prst="rect">
@@ -4994,7 +5035,7 @@
         </p:nvSpPr>
         <p:spPr>
           <a:xfrm>
-            <a:off x="6885263" y="4307053"/>
+            <a:off x="8529506" y="4164441"/>
             <a:ext cx="591423" cy="365615"/>
           </a:xfrm>
           <a:prstGeom prst="rect">
@@ -5040,7 +5081,7 @@
         </p:nvSpPr>
         <p:spPr>
           <a:xfrm>
-            <a:off x="6885263" y="4738392"/>
+            <a:off x="8529506" y="4595780"/>
             <a:ext cx="591423" cy="365615"/>
           </a:xfrm>
           <a:prstGeom prst="rect">
@@ -5086,7 +5127,7 @@
         </p:nvSpPr>
         <p:spPr>
           <a:xfrm>
-            <a:off x="8636465" y="3816991"/>
+            <a:off x="10280708" y="3674379"/>
             <a:ext cx="1400960" cy="600164"/>
           </a:xfrm>
           <a:prstGeom prst="rect">
@@ -5121,7 +5162,7 @@
         </p:nvSpPr>
         <p:spPr>
           <a:xfrm>
-            <a:off x="6044355" y="3816991"/>
+            <a:off x="7688598" y="3674379"/>
             <a:ext cx="1681816" cy="673648"/>
           </a:xfrm>
           <a:prstGeom prst="rect">
@@ -5199,6 +5240,338 @@
             <a:r>
               <a:rPr lang="en-US" dirty="0"/>
               <a:t>Yoga For Everyone Wireframe – Group 3</a:t>
+            </a:r>
+          </a:p>
+        </p:txBody>
+      </p:sp>
+      <p:sp>
+        <p:nvSpPr>
+          <p:cNvPr id="2" name="Rectangle 1">
+            <a:extLst>
+              <a:ext uri="{FF2B5EF4-FFF2-40B4-BE49-F238E27FC236}">
+                <a16:creationId xmlns:a16="http://schemas.microsoft.com/office/drawing/2014/main" id="{4AAEAC07-CE48-D026-729B-6D56C788F62A}"/>
+              </a:ext>
+            </a:extLst>
+          </p:cNvPr>
+          <p:cNvSpPr/>
+          <p:nvPr/>
+        </p:nvSpPr>
+        <p:spPr>
+          <a:xfrm>
+            <a:off x="71310" y="602277"/>
+            <a:ext cx="2684827" cy="3201940"/>
+          </a:xfrm>
+          <a:prstGeom prst="rect">
+            <a:avLst/>
+          </a:prstGeom>
+          <a:solidFill>
+            <a:schemeClr val="accent3">
+              <a:alpha val="32000"/>
+            </a:schemeClr>
+          </a:solidFill>
+        </p:spPr>
+        <p:style>
+          <a:lnRef idx="2">
+            <a:schemeClr val="accent3">
+              <a:shade val="50000"/>
+            </a:schemeClr>
+          </a:lnRef>
+          <a:fillRef idx="1">
+            <a:schemeClr val="accent3"/>
+          </a:fillRef>
+          <a:effectRef idx="0">
+            <a:schemeClr val="accent3"/>
+          </a:effectRef>
+          <a:fontRef idx="minor">
+            <a:schemeClr val="lt1"/>
+          </a:fontRef>
+        </p:style>
+        <p:txBody>
+          <a:bodyPr rtlCol="0" anchor="ctr"/>
+          <a:lstStyle/>
+          <a:p>
+            <a:pPr algn="ctr"/>
+            <a:endParaRPr lang="en-US"/>
+          </a:p>
+        </p:txBody>
+      </p:sp>
+      <p:sp>
+        <p:nvSpPr>
+          <p:cNvPr id="3" name="Rectangle 2">
+            <a:extLst>
+              <a:ext uri="{FF2B5EF4-FFF2-40B4-BE49-F238E27FC236}">
+                <a16:creationId xmlns:a16="http://schemas.microsoft.com/office/drawing/2014/main" id="{6F39947F-E7DA-7778-5C13-26B39915AD25}"/>
+              </a:ext>
+            </a:extLst>
+          </p:cNvPr>
+          <p:cNvSpPr/>
+          <p:nvPr/>
+        </p:nvSpPr>
+        <p:spPr>
+          <a:xfrm>
+            <a:off x="6148939" y="1155927"/>
+            <a:ext cx="1059617" cy="303417"/>
+          </a:xfrm>
+          <a:prstGeom prst="rect">
+            <a:avLst/>
+          </a:prstGeom>
+        </p:spPr>
+        <p:style>
+          <a:lnRef idx="2">
+            <a:schemeClr val="accent3">
+              <a:shade val="50000"/>
+            </a:schemeClr>
+          </a:lnRef>
+          <a:fillRef idx="1">
+            <a:schemeClr val="accent3"/>
+          </a:fillRef>
+          <a:effectRef idx="0">
+            <a:schemeClr val="accent3"/>
+          </a:effectRef>
+          <a:fontRef idx="minor">
+            <a:schemeClr val="lt1"/>
+          </a:fontRef>
+        </p:style>
+        <p:txBody>
+          <a:bodyPr rtlCol="0" anchor="ctr"/>
+          <a:lstStyle/>
+          <a:p>
+            <a:pPr algn="ctr"/>
+            <a:r>
+              <a:rPr lang="en-US" dirty="0"/>
+              <a:t>Log Out</a:t>
+            </a:r>
+          </a:p>
+        </p:txBody>
+      </p:sp>
+      <p:sp>
+        <p:nvSpPr>
+          <p:cNvPr id="9" name="Rectangle 8">
+            <a:extLst>
+              <a:ext uri="{FF2B5EF4-FFF2-40B4-BE49-F238E27FC236}">
+                <a16:creationId xmlns:a16="http://schemas.microsoft.com/office/drawing/2014/main" id="{BA5D9DEC-10A1-4DBC-2163-53A3859BBD66}"/>
+              </a:ext>
+            </a:extLst>
+          </p:cNvPr>
+          <p:cNvSpPr/>
+          <p:nvPr/>
+        </p:nvSpPr>
+        <p:spPr>
+          <a:xfrm>
+            <a:off x="500187" y="1355871"/>
+            <a:ext cx="2108429" cy="1116432"/>
+          </a:xfrm>
+          <a:prstGeom prst="rect">
+            <a:avLst/>
+          </a:prstGeom>
+        </p:spPr>
+        <p:style>
+          <a:lnRef idx="1">
+            <a:schemeClr val="accent3"/>
+          </a:lnRef>
+          <a:fillRef idx="2">
+            <a:schemeClr val="accent3"/>
+          </a:fillRef>
+          <a:effectRef idx="1">
+            <a:schemeClr val="accent3"/>
+          </a:effectRef>
+          <a:fontRef idx="minor">
+            <a:schemeClr val="dk1"/>
+          </a:fontRef>
+        </p:style>
+        <p:txBody>
+          <a:bodyPr rtlCol="0" anchor="ctr"/>
+          <a:lstStyle/>
+          <a:p>
+            <a:pPr algn="ctr"/>
+            <a:endParaRPr lang="en-US"/>
+          </a:p>
+        </p:txBody>
+      </p:sp>
+      <p:sp>
+        <p:nvSpPr>
+          <p:cNvPr id="10" name="Rectangle 9">
+            <a:extLst>
+              <a:ext uri="{FF2B5EF4-FFF2-40B4-BE49-F238E27FC236}">
+                <a16:creationId xmlns:a16="http://schemas.microsoft.com/office/drawing/2014/main" id="{BC4682DC-F5B2-5039-4728-708483D8C710}"/>
+              </a:ext>
+            </a:extLst>
+          </p:cNvPr>
+          <p:cNvSpPr/>
+          <p:nvPr/>
+        </p:nvSpPr>
+        <p:spPr>
+          <a:xfrm>
+            <a:off x="860560" y="1613831"/>
+            <a:ext cx="1328252" cy="156245"/>
+          </a:xfrm>
+          <a:prstGeom prst="rect">
+            <a:avLst/>
+          </a:prstGeom>
+        </p:spPr>
+        <p:style>
+          <a:lnRef idx="2">
+            <a:schemeClr val="dk1"/>
+          </a:lnRef>
+          <a:fillRef idx="1">
+            <a:schemeClr val="lt1"/>
+          </a:fillRef>
+          <a:effectRef idx="0">
+            <a:schemeClr val="dk1"/>
+          </a:effectRef>
+          <a:fontRef idx="minor">
+            <a:schemeClr val="dk1"/>
+          </a:fontRef>
+        </p:style>
+        <p:txBody>
+          <a:bodyPr rtlCol="0" anchor="ctr"/>
+          <a:lstStyle/>
+          <a:p>
+            <a:pPr algn="ctr"/>
+            <a:r>
+              <a:rPr lang="en-US" dirty="0"/>
+              <a:t>username</a:t>
+            </a:r>
+          </a:p>
+        </p:txBody>
+      </p:sp>
+      <p:sp>
+        <p:nvSpPr>
+          <p:cNvPr id="59" name="Rectangle 58">
+            <a:extLst>
+              <a:ext uri="{FF2B5EF4-FFF2-40B4-BE49-F238E27FC236}">
+                <a16:creationId xmlns:a16="http://schemas.microsoft.com/office/drawing/2014/main" id="{4428481F-B1E6-81E0-6C34-23A8691A753C}"/>
+              </a:ext>
+            </a:extLst>
+          </p:cNvPr>
+          <p:cNvSpPr/>
+          <p:nvPr/>
+        </p:nvSpPr>
+        <p:spPr>
+          <a:xfrm>
+            <a:off x="864066" y="1969060"/>
+            <a:ext cx="1328252" cy="156245"/>
+          </a:xfrm>
+          <a:prstGeom prst="rect">
+            <a:avLst/>
+          </a:prstGeom>
+        </p:spPr>
+        <p:style>
+          <a:lnRef idx="2">
+            <a:schemeClr val="dk1"/>
+          </a:lnRef>
+          <a:fillRef idx="1">
+            <a:schemeClr val="lt1"/>
+          </a:fillRef>
+          <a:effectRef idx="0">
+            <a:schemeClr val="dk1"/>
+          </a:effectRef>
+          <a:fontRef idx="minor">
+            <a:schemeClr val="dk1"/>
+          </a:fontRef>
+        </p:style>
+        <p:txBody>
+          <a:bodyPr rtlCol="0" anchor="ctr"/>
+          <a:lstStyle/>
+          <a:p>
+            <a:pPr algn="ctr"/>
+            <a:r>
+              <a:rPr lang="en-US" dirty="0"/>
+              <a:t>password</a:t>
+            </a:r>
+          </a:p>
+        </p:txBody>
+      </p:sp>
+      <p:sp>
+        <p:nvSpPr>
+          <p:cNvPr id="11" name="Rectangle 10">
+            <a:extLst>
+              <a:ext uri="{FF2B5EF4-FFF2-40B4-BE49-F238E27FC236}">
+                <a16:creationId xmlns:a16="http://schemas.microsoft.com/office/drawing/2014/main" id="{788DE01B-314E-12E3-026C-C9AE58567F7C}"/>
+              </a:ext>
+            </a:extLst>
+          </p:cNvPr>
+          <p:cNvSpPr/>
+          <p:nvPr/>
+        </p:nvSpPr>
+        <p:spPr>
+          <a:xfrm>
+            <a:off x="1694576" y="2244119"/>
+            <a:ext cx="598764" cy="156245"/>
+          </a:xfrm>
+          <a:prstGeom prst="rect">
+            <a:avLst/>
+          </a:prstGeom>
+        </p:spPr>
+        <p:style>
+          <a:lnRef idx="1">
+            <a:schemeClr val="accent3"/>
+          </a:lnRef>
+          <a:fillRef idx="2">
+            <a:schemeClr val="accent3"/>
+          </a:fillRef>
+          <a:effectRef idx="1">
+            <a:schemeClr val="accent3"/>
+          </a:effectRef>
+          <a:fontRef idx="minor">
+            <a:schemeClr val="dk1"/>
+          </a:fontRef>
+        </p:style>
+        <p:txBody>
+          <a:bodyPr rtlCol="0" anchor="ctr"/>
+          <a:lstStyle/>
+          <a:p>
+            <a:pPr algn="ctr"/>
+            <a:r>
+              <a:rPr lang="en-US" sz="1100" dirty="0"/>
+              <a:t>submit</a:t>
+            </a:r>
+          </a:p>
+        </p:txBody>
+      </p:sp>
+      <p:sp>
+        <p:nvSpPr>
+          <p:cNvPr id="61" name="Rectangle 60">
+            <a:extLst>
+              <a:ext uri="{FF2B5EF4-FFF2-40B4-BE49-F238E27FC236}">
+                <a16:creationId xmlns:a16="http://schemas.microsoft.com/office/drawing/2014/main" id="{7936450A-FFA8-5B97-4D0D-293D8293036C}"/>
+              </a:ext>
+            </a:extLst>
+          </p:cNvPr>
+          <p:cNvSpPr/>
+          <p:nvPr/>
+        </p:nvSpPr>
+        <p:spPr>
+          <a:xfrm>
+            <a:off x="184558" y="611699"/>
+            <a:ext cx="914400" cy="545284"/>
+          </a:xfrm>
+          <a:prstGeom prst="rect">
+            <a:avLst/>
+          </a:prstGeom>
+        </p:spPr>
+        <p:style>
+          <a:lnRef idx="2">
+            <a:schemeClr val="dk1"/>
+          </a:lnRef>
+          <a:fillRef idx="1">
+            <a:schemeClr val="lt1"/>
+          </a:fillRef>
+          <a:effectRef idx="0">
+            <a:schemeClr val="dk1"/>
+          </a:effectRef>
+          <a:fontRef idx="minor">
+            <a:schemeClr val="dk1"/>
+          </a:fontRef>
+        </p:style>
+        <p:txBody>
+          <a:bodyPr rtlCol="0" anchor="ctr"/>
+          <a:lstStyle/>
+          <a:p>
+            <a:pPr algn="ctr"/>
+            <a:r>
+              <a:rPr lang="en-US" dirty="0"/>
+              <a:t>Logo</a:t>
             </a:r>
           </a:p>
         </p:txBody>

</xml_diff>